<commit_message>
added 3 SQL assignments
</commit_message>
<xml_diff>
--- a/TSQL/1-Entity-Relationship-Model/Problem 1/ERM-Problem1-ArticlesAndOrders.pptx
+++ b/TSQL/1-Entity-Relationship-Model/Problem 1/ERM-Problem1-ArticlesAndOrders.pptx
@@ -6,6 +6,7 @@
   </p:sldMasterIdLst>
   <p:sldIdLst>
     <p:sldId id="256" r:id="rId2"/>
+    <p:sldId id="257" r:id="rId3"/>
   </p:sldIdLst>
   <p:sldSz cx="12192000" cy="6858000"/>
   <p:notesSz cx="6858000" cy="9144000"/>
@@ -104,6 +105,11 @@
       </a:defRPr>
     </a:lvl9pPr>
   </p:defaultTextStyle>
+  <p:extLst>
+    <p:ext uri="{EFAFB233-063F-42B5-8137-9DF3F51BA10A}">
+      <p15:sldGuideLst xmlns:p15="http://schemas.microsoft.com/office/powerpoint/2012/main"/>
+    </p:ext>
+  </p:extLst>
 </p:presentation>
 </file>
 
@@ -254,7 +260,7 @@
           <a:p>
             <a:fld id="{6581B9BE-5482-4B43-AD1B-4B7BE30D39D5}" type="datetimeFigureOut">
               <a:rPr lang="en-US" smtClean="0"/>
-              <a:t>12/14/2021</a:t>
+              <a:t>12/15/2021</a:t>
             </a:fld>
             <a:endParaRPr lang="en-US"/>
           </a:p>
@@ -452,7 +458,7 @@
           <a:p>
             <a:fld id="{6581B9BE-5482-4B43-AD1B-4B7BE30D39D5}" type="datetimeFigureOut">
               <a:rPr lang="en-US" smtClean="0"/>
-              <a:t>12/14/2021</a:t>
+              <a:t>12/15/2021</a:t>
             </a:fld>
             <a:endParaRPr lang="en-US"/>
           </a:p>
@@ -660,7 +666,7 @@
           <a:p>
             <a:fld id="{6581B9BE-5482-4B43-AD1B-4B7BE30D39D5}" type="datetimeFigureOut">
               <a:rPr lang="en-US" smtClean="0"/>
-              <a:t>12/14/2021</a:t>
+              <a:t>12/15/2021</a:t>
             </a:fld>
             <a:endParaRPr lang="en-US"/>
           </a:p>
@@ -858,7 +864,7 @@
           <a:p>
             <a:fld id="{6581B9BE-5482-4B43-AD1B-4B7BE30D39D5}" type="datetimeFigureOut">
               <a:rPr lang="en-US" smtClean="0"/>
-              <a:t>12/14/2021</a:t>
+              <a:t>12/15/2021</a:t>
             </a:fld>
             <a:endParaRPr lang="en-US"/>
           </a:p>
@@ -1133,7 +1139,7 @@
           <a:p>
             <a:fld id="{6581B9BE-5482-4B43-AD1B-4B7BE30D39D5}" type="datetimeFigureOut">
               <a:rPr lang="en-US" smtClean="0"/>
-              <a:t>12/14/2021</a:t>
+              <a:t>12/15/2021</a:t>
             </a:fld>
             <a:endParaRPr lang="en-US"/>
           </a:p>
@@ -1398,7 +1404,7 @@
           <a:p>
             <a:fld id="{6581B9BE-5482-4B43-AD1B-4B7BE30D39D5}" type="datetimeFigureOut">
               <a:rPr lang="en-US" smtClean="0"/>
-              <a:t>12/14/2021</a:t>
+              <a:t>12/15/2021</a:t>
             </a:fld>
             <a:endParaRPr lang="en-US"/>
           </a:p>
@@ -1810,7 +1816,7 @@
           <a:p>
             <a:fld id="{6581B9BE-5482-4B43-AD1B-4B7BE30D39D5}" type="datetimeFigureOut">
               <a:rPr lang="en-US" smtClean="0"/>
-              <a:t>12/14/2021</a:t>
+              <a:t>12/15/2021</a:t>
             </a:fld>
             <a:endParaRPr lang="en-US"/>
           </a:p>
@@ -1951,7 +1957,7 @@
           <a:p>
             <a:fld id="{6581B9BE-5482-4B43-AD1B-4B7BE30D39D5}" type="datetimeFigureOut">
               <a:rPr lang="en-US" smtClean="0"/>
-              <a:t>12/14/2021</a:t>
+              <a:t>12/15/2021</a:t>
             </a:fld>
             <a:endParaRPr lang="en-US"/>
           </a:p>
@@ -2064,7 +2070,7 @@
           <a:p>
             <a:fld id="{6581B9BE-5482-4B43-AD1B-4B7BE30D39D5}" type="datetimeFigureOut">
               <a:rPr lang="en-US" smtClean="0"/>
-              <a:t>12/14/2021</a:t>
+              <a:t>12/15/2021</a:t>
             </a:fld>
             <a:endParaRPr lang="en-US"/>
           </a:p>
@@ -2375,7 +2381,7 @@
           <a:p>
             <a:fld id="{6581B9BE-5482-4B43-AD1B-4B7BE30D39D5}" type="datetimeFigureOut">
               <a:rPr lang="en-US" smtClean="0"/>
-              <a:t>12/14/2021</a:t>
+              <a:t>12/15/2021</a:t>
             </a:fld>
             <a:endParaRPr lang="en-US"/>
           </a:p>
@@ -2663,7 +2669,7 @@
           <a:p>
             <a:fld id="{6581B9BE-5482-4B43-AD1B-4B7BE30D39D5}" type="datetimeFigureOut">
               <a:rPr lang="en-US" smtClean="0"/>
-              <a:t>12/14/2021</a:t>
+              <a:t>12/15/2021</a:t>
             </a:fld>
             <a:endParaRPr lang="en-US"/>
           </a:p>
@@ -2904,7 +2910,7 @@
           <a:p>
             <a:fld id="{6581B9BE-5482-4B43-AD1B-4B7BE30D39D5}" type="datetimeFigureOut">
               <a:rPr lang="en-US" smtClean="0"/>
-              <a:t>12/14/2021</a:t>
+              <a:t>12/15/2021</a:t>
             </a:fld>
             <a:endParaRPr lang="en-US"/>
           </a:p>
@@ -5899,6 +5905,752 @@
 </p:sld>
 </file>
 
+<file path=ppt/slides/slide2.xml><?xml version="1.0" encoding="utf-8"?>
+<p:sld xmlns:a="http://schemas.openxmlformats.org/drawingml/2006/main" xmlns:r="http://schemas.openxmlformats.org/officeDocument/2006/relationships" xmlns:p="http://schemas.openxmlformats.org/presentationml/2006/main">
+  <p:cSld>
+    <p:spTree>
+      <p:nvGrpSpPr>
+        <p:cNvPr id="1" name=""/>
+        <p:cNvGrpSpPr/>
+        <p:nvPr/>
+      </p:nvGrpSpPr>
+      <p:grpSpPr>
+        <a:xfrm>
+          <a:off x="0" y="0"/>
+          <a:ext cx="0" cy="0"/>
+          <a:chOff x="0" y="0"/>
+          <a:chExt cx="0" cy="0"/>
+        </a:xfrm>
+      </p:grpSpPr>
+      <p:graphicFrame>
+        <p:nvGraphicFramePr>
+          <p:cNvPr id="4" name="Table 4">
+            <a:extLst>
+              <a:ext uri="{FF2B5EF4-FFF2-40B4-BE49-F238E27FC236}">
+                <a16:creationId xmlns:a16="http://schemas.microsoft.com/office/drawing/2014/main" id="{37FB9410-8E8A-4B82-AFEC-11D062E147DD}"/>
+              </a:ext>
+            </a:extLst>
+          </p:cNvPr>
+          <p:cNvGraphicFramePr>
+            <a:graphicFrameLocks noGrp="1"/>
+          </p:cNvGraphicFramePr>
+          <p:nvPr/>
+        </p:nvGraphicFramePr>
+        <p:xfrm>
+          <a:off x="280112" y="497474"/>
+          <a:ext cx="5683905" cy="951887"/>
+        </p:xfrm>
+        <a:graphic>
+          <a:graphicData uri="http://schemas.openxmlformats.org/drawingml/2006/table">
+            <a:tbl>
+              <a:tblPr firstRow="1" bandRow="1">
+                <a:tableStyleId>{5C22544A-7EE6-4342-B048-85BDC9FD1C3A}</a:tableStyleId>
+              </a:tblPr>
+              <a:tblGrid>
+                <a:gridCol w="1136781">
+                  <a:extLst>
+                    <a:ext uri="{9D8B030D-6E8A-4147-A177-3AD203B41FA5}">
+                      <a16:colId xmlns:a16="http://schemas.microsoft.com/office/drawing/2014/main" val="93918904"/>
+                    </a:ext>
+                  </a:extLst>
+                </a:gridCol>
+                <a:gridCol w="1136781">
+                  <a:extLst>
+                    <a:ext uri="{9D8B030D-6E8A-4147-A177-3AD203B41FA5}">
+                      <a16:colId xmlns:a16="http://schemas.microsoft.com/office/drawing/2014/main" val="1426163993"/>
+                    </a:ext>
+                  </a:extLst>
+                </a:gridCol>
+                <a:gridCol w="1136781">
+                  <a:extLst>
+                    <a:ext uri="{9D8B030D-6E8A-4147-A177-3AD203B41FA5}">
+                      <a16:colId xmlns:a16="http://schemas.microsoft.com/office/drawing/2014/main" val="1897031396"/>
+                    </a:ext>
+                  </a:extLst>
+                </a:gridCol>
+                <a:gridCol w="1136781">
+                  <a:extLst>
+                    <a:ext uri="{9D8B030D-6E8A-4147-A177-3AD203B41FA5}">
+                      <a16:colId xmlns:a16="http://schemas.microsoft.com/office/drawing/2014/main" val="3416176941"/>
+                    </a:ext>
+                  </a:extLst>
+                </a:gridCol>
+                <a:gridCol w="1136781">
+                  <a:extLst>
+                    <a:ext uri="{9D8B030D-6E8A-4147-A177-3AD203B41FA5}">
+                      <a16:colId xmlns:a16="http://schemas.microsoft.com/office/drawing/2014/main" val="3183010009"/>
+                    </a:ext>
+                  </a:extLst>
+                </a:gridCol>
+              </a:tblGrid>
+              <a:tr h="504492">
+                <a:tc>
+                  <a:txBody>
+                    <a:bodyPr/>
+                    <a:lstStyle/>
+                    <a:p>
+                      <a:r>
+                        <a:rPr lang="en-US" sz="1400" dirty="0"/>
+                        <a:t>Customer #</a:t>
+                      </a:r>
+                    </a:p>
+                  </a:txBody>
+                  <a:tcPr/>
+                </a:tc>
+                <a:tc>
+                  <a:txBody>
+                    <a:bodyPr/>
+                    <a:lstStyle/>
+                    <a:p>
+                      <a:r>
+                        <a:rPr lang="en-US" sz="1400" dirty="0"/>
+                        <a:t>Name</a:t>
+                      </a:r>
+                    </a:p>
+                  </a:txBody>
+                  <a:tcPr/>
+                </a:tc>
+                <a:tc>
+                  <a:txBody>
+                    <a:bodyPr/>
+                    <a:lstStyle/>
+                    <a:p>
+                      <a:r>
+                        <a:rPr lang="en-US" sz="1400" dirty="0"/>
+                        <a:t>Balance</a:t>
+                      </a:r>
+                    </a:p>
+                  </a:txBody>
+                  <a:tcPr/>
+                </a:tc>
+                <a:tc>
+                  <a:txBody>
+                    <a:bodyPr/>
+                    <a:lstStyle/>
+                    <a:p>
+                      <a:r>
+                        <a:rPr lang="en-US" sz="1400" dirty="0"/>
+                        <a:t>Credit Limit</a:t>
+                      </a:r>
+                    </a:p>
+                  </a:txBody>
+                  <a:tcPr/>
+                </a:tc>
+                <a:tc>
+                  <a:txBody>
+                    <a:bodyPr/>
+                    <a:lstStyle/>
+                    <a:p>
+                      <a:r>
+                        <a:rPr lang="en-US" sz="1400" dirty="0"/>
+                        <a:t>Shipping Address</a:t>
+                      </a:r>
+                    </a:p>
+                  </a:txBody>
+                  <a:tcPr/>
+                </a:tc>
+                <a:extLst>
+                  <a:ext uri="{0D108BD9-81ED-4DB2-BD59-A6C34878D82A}">
+                    <a16:rowId xmlns:a16="http://schemas.microsoft.com/office/drawing/2014/main" val="3847518865"/>
+                  </a:ext>
+                </a:extLst>
+              </a:tr>
+              <a:tr h="433727">
+                <a:tc>
+                  <a:txBody>
+                    <a:bodyPr/>
+                    <a:lstStyle/>
+                    <a:p>
+                      <a:endParaRPr lang="en-US" dirty="0"/>
+                    </a:p>
+                  </a:txBody>
+                  <a:tcPr/>
+                </a:tc>
+                <a:tc>
+                  <a:txBody>
+                    <a:bodyPr/>
+                    <a:lstStyle/>
+                    <a:p>
+                      <a:endParaRPr lang="en-US" dirty="0"/>
+                    </a:p>
+                  </a:txBody>
+                  <a:tcPr/>
+                </a:tc>
+                <a:tc>
+                  <a:txBody>
+                    <a:bodyPr/>
+                    <a:lstStyle/>
+                    <a:p>
+                      <a:endParaRPr lang="en-US" dirty="0"/>
+                    </a:p>
+                  </a:txBody>
+                  <a:tcPr/>
+                </a:tc>
+                <a:tc>
+                  <a:txBody>
+                    <a:bodyPr/>
+                    <a:lstStyle/>
+                    <a:p>
+                      <a:endParaRPr lang="en-US" dirty="0"/>
+                    </a:p>
+                  </a:txBody>
+                  <a:tcPr/>
+                </a:tc>
+                <a:tc>
+                  <a:txBody>
+                    <a:bodyPr/>
+                    <a:lstStyle/>
+                    <a:p>
+                      <a:endParaRPr lang="en-US" dirty="0"/>
+                    </a:p>
+                  </a:txBody>
+                  <a:tcPr/>
+                </a:tc>
+                <a:extLst>
+                  <a:ext uri="{0D108BD9-81ED-4DB2-BD59-A6C34878D82A}">
+                    <a16:rowId xmlns:a16="http://schemas.microsoft.com/office/drawing/2014/main" val="159226802"/>
+                  </a:ext>
+                </a:extLst>
+              </a:tr>
+            </a:tbl>
+          </a:graphicData>
+        </a:graphic>
+      </p:graphicFrame>
+      <p:graphicFrame>
+        <p:nvGraphicFramePr>
+          <p:cNvPr id="5" name="Table 4">
+            <a:extLst>
+              <a:ext uri="{FF2B5EF4-FFF2-40B4-BE49-F238E27FC236}">
+                <a16:creationId xmlns:a16="http://schemas.microsoft.com/office/drawing/2014/main" id="{34140D29-E652-436C-9582-FF990B89D777}"/>
+              </a:ext>
+            </a:extLst>
+          </p:cNvPr>
+          <p:cNvGraphicFramePr>
+            <a:graphicFrameLocks noGrp="1"/>
+          </p:cNvGraphicFramePr>
+          <p:nvPr/>
+        </p:nvGraphicFramePr>
+        <p:xfrm>
+          <a:off x="280113" y="2687320"/>
+          <a:ext cx="5683908" cy="1073808"/>
+        </p:xfrm>
+        <a:graphic>
+          <a:graphicData uri="http://schemas.openxmlformats.org/drawingml/2006/table">
+            <a:tbl>
+              <a:tblPr firstRow="1" bandRow="1">
+                <a:tableStyleId>{5C22544A-7EE6-4342-B048-85BDC9FD1C3A}</a:tableStyleId>
+              </a:tblPr>
+              <a:tblGrid>
+                <a:gridCol w="947318">
+                  <a:extLst>
+                    <a:ext uri="{9D8B030D-6E8A-4147-A177-3AD203B41FA5}">
+                      <a16:colId xmlns:a16="http://schemas.microsoft.com/office/drawing/2014/main" val="93918904"/>
+                    </a:ext>
+                  </a:extLst>
+                </a:gridCol>
+                <a:gridCol w="947318">
+                  <a:extLst>
+                    <a:ext uri="{9D8B030D-6E8A-4147-A177-3AD203B41FA5}">
+                      <a16:colId xmlns:a16="http://schemas.microsoft.com/office/drawing/2014/main" val="1897031396"/>
+                    </a:ext>
+                  </a:extLst>
+                </a:gridCol>
+                <a:gridCol w="947318">
+                  <a:extLst>
+                    <a:ext uri="{9D8B030D-6E8A-4147-A177-3AD203B41FA5}">
+                      <a16:colId xmlns:a16="http://schemas.microsoft.com/office/drawing/2014/main" val="3843529089"/>
+                    </a:ext>
+                  </a:extLst>
+                </a:gridCol>
+                <a:gridCol w="947318">
+                  <a:extLst>
+                    <a:ext uri="{9D8B030D-6E8A-4147-A177-3AD203B41FA5}">
+                      <a16:colId xmlns:a16="http://schemas.microsoft.com/office/drawing/2014/main" val="3416176941"/>
+                    </a:ext>
+                  </a:extLst>
+                </a:gridCol>
+                <a:gridCol w="947318">
+                  <a:extLst>
+                    <a:ext uri="{9D8B030D-6E8A-4147-A177-3AD203B41FA5}">
+                      <a16:colId xmlns:a16="http://schemas.microsoft.com/office/drawing/2014/main" val="3183010009"/>
+                    </a:ext>
+                  </a:extLst>
+                </a:gridCol>
+                <a:gridCol w="947318">
+                  <a:extLst>
+                    <a:ext uri="{9D8B030D-6E8A-4147-A177-3AD203B41FA5}">
+                      <a16:colId xmlns:a16="http://schemas.microsoft.com/office/drawing/2014/main" val="2171157315"/>
+                    </a:ext>
+                  </a:extLst>
+                </a:gridCol>
+              </a:tblGrid>
+              <a:tr h="536904">
+                <a:tc>
+                  <a:txBody>
+                    <a:bodyPr/>
+                    <a:lstStyle/>
+                    <a:p>
+                      <a:r>
+                        <a:rPr lang="en-US" sz="1200" dirty="0"/>
+                        <a:t>Order #</a:t>
+                      </a:r>
+                    </a:p>
+                  </a:txBody>
+                  <a:tcPr/>
+                </a:tc>
+                <a:tc>
+                  <a:txBody>
+                    <a:bodyPr/>
+                    <a:lstStyle/>
+                    <a:p>
+                      <a:r>
+                        <a:rPr lang="en-US" sz="1200" dirty="0"/>
+                        <a:t>Shipping Address</a:t>
+                      </a:r>
+                    </a:p>
+                  </a:txBody>
+                  <a:tcPr/>
+                </a:tc>
+                <a:tc>
+                  <a:txBody>
+                    <a:bodyPr/>
+                    <a:lstStyle/>
+                    <a:p>
+                      <a:r>
+                        <a:rPr lang="en-US" sz="1200" dirty="0"/>
+                        <a:t>Quantity</a:t>
+                      </a:r>
+                    </a:p>
+                  </a:txBody>
+                  <a:tcPr/>
+                </a:tc>
+                <a:tc>
+                  <a:txBody>
+                    <a:bodyPr/>
+                    <a:lstStyle/>
+                    <a:p>
+                      <a:r>
+                        <a:rPr lang="en-US" sz="1200" dirty="0"/>
+                        <a:t>Order Date</a:t>
+                      </a:r>
+                    </a:p>
+                  </a:txBody>
+                  <a:tcPr/>
+                </a:tc>
+                <a:tc>
+                  <a:txBody>
+                    <a:bodyPr/>
+                    <a:lstStyle/>
+                    <a:p>
+                      <a:r>
+                        <a:rPr lang="en-US" sz="1200" dirty="0"/>
+                        <a:t>Item #</a:t>
+                      </a:r>
+                    </a:p>
+                  </a:txBody>
+                  <a:tcPr/>
+                </a:tc>
+                <a:tc>
+                  <a:txBody>
+                    <a:bodyPr/>
+                    <a:lstStyle/>
+                    <a:p>
+                      <a:r>
+                        <a:rPr lang="en-US" sz="1200" dirty="0"/>
+                        <a:t>Customer #</a:t>
+                      </a:r>
+                    </a:p>
+                  </a:txBody>
+                  <a:tcPr/>
+                </a:tc>
+                <a:extLst>
+                  <a:ext uri="{0D108BD9-81ED-4DB2-BD59-A6C34878D82A}">
+                    <a16:rowId xmlns:a16="http://schemas.microsoft.com/office/drawing/2014/main" val="3847518865"/>
+                  </a:ext>
+                </a:extLst>
+              </a:tr>
+              <a:tr h="536904">
+                <a:tc>
+                  <a:txBody>
+                    <a:bodyPr/>
+                    <a:lstStyle/>
+                    <a:p>
+                      <a:endParaRPr lang="en-US" dirty="0"/>
+                    </a:p>
+                  </a:txBody>
+                  <a:tcPr/>
+                </a:tc>
+                <a:tc>
+                  <a:txBody>
+                    <a:bodyPr/>
+                    <a:lstStyle/>
+                    <a:p>
+                      <a:endParaRPr lang="en-US" dirty="0"/>
+                    </a:p>
+                  </a:txBody>
+                  <a:tcPr/>
+                </a:tc>
+                <a:tc>
+                  <a:txBody>
+                    <a:bodyPr/>
+                    <a:lstStyle/>
+                    <a:p>
+                      <a:endParaRPr lang="en-US" dirty="0"/>
+                    </a:p>
+                  </a:txBody>
+                  <a:tcPr/>
+                </a:tc>
+                <a:tc>
+                  <a:txBody>
+                    <a:bodyPr/>
+                    <a:lstStyle/>
+                    <a:p>
+                      <a:endParaRPr lang="en-US" dirty="0"/>
+                    </a:p>
+                  </a:txBody>
+                  <a:tcPr/>
+                </a:tc>
+                <a:tc>
+                  <a:txBody>
+                    <a:bodyPr/>
+                    <a:lstStyle/>
+                    <a:p>
+                      <a:endParaRPr lang="en-US" dirty="0"/>
+                    </a:p>
+                  </a:txBody>
+                  <a:tcPr/>
+                </a:tc>
+                <a:tc>
+                  <a:txBody>
+                    <a:bodyPr/>
+                    <a:lstStyle/>
+                    <a:p>
+                      <a:endParaRPr lang="en-US" dirty="0"/>
+                    </a:p>
+                  </a:txBody>
+                  <a:tcPr/>
+                </a:tc>
+                <a:extLst>
+                  <a:ext uri="{0D108BD9-81ED-4DB2-BD59-A6C34878D82A}">
+                    <a16:rowId xmlns:a16="http://schemas.microsoft.com/office/drawing/2014/main" val="159226802"/>
+                  </a:ext>
+                </a:extLst>
+              </a:tr>
+            </a:tbl>
+          </a:graphicData>
+        </a:graphic>
+      </p:graphicFrame>
+      <p:graphicFrame>
+        <p:nvGraphicFramePr>
+          <p:cNvPr id="6" name="Table 4">
+            <a:extLst>
+              <a:ext uri="{FF2B5EF4-FFF2-40B4-BE49-F238E27FC236}">
+                <a16:creationId xmlns:a16="http://schemas.microsoft.com/office/drawing/2014/main" id="{CC20BB69-D61D-43AA-BB03-223BF29B6DDF}"/>
+              </a:ext>
+            </a:extLst>
+          </p:cNvPr>
+          <p:cNvGraphicFramePr>
+            <a:graphicFrameLocks noGrp="1"/>
+          </p:cNvGraphicFramePr>
+          <p:nvPr/>
+        </p:nvGraphicFramePr>
+        <p:xfrm>
+          <a:off x="6227985" y="497474"/>
+          <a:ext cx="5815888" cy="1073808"/>
+        </p:xfrm>
+        <a:graphic>
+          <a:graphicData uri="http://schemas.openxmlformats.org/drawingml/2006/table">
+            <a:tbl>
+              <a:tblPr firstRow="1" bandRow="1">
+                <a:tableStyleId>{5C22544A-7EE6-4342-B048-85BDC9FD1C3A}</a:tableStyleId>
+              </a:tblPr>
+              <a:tblGrid>
+                <a:gridCol w="1453972">
+                  <a:extLst>
+                    <a:ext uri="{9D8B030D-6E8A-4147-A177-3AD203B41FA5}">
+                      <a16:colId xmlns:a16="http://schemas.microsoft.com/office/drawing/2014/main" val="93918904"/>
+                    </a:ext>
+                  </a:extLst>
+                </a:gridCol>
+                <a:gridCol w="1453972">
+                  <a:extLst>
+                    <a:ext uri="{9D8B030D-6E8A-4147-A177-3AD203B41FA5}">
+                      <a16:colId xmlns:a16="http://schemas.microsoft.com/office/drawing/2014/main" val="4088962468"/>
+                    </a:ext>
+                  </a:extLst>
+                </a:gridCol>
+                <a:gridCol w="1453972">
+                  <a:extLst>
+                    <a:ext uri="{9D8B030D-6E8A-4147-A177-3AD203B41FA5}">
+                      <a16:colId xmlns:a16="http://schemas.microsoft.com/office/drawing/2014/main" val="1897031396"/>
+                    </a:ext>
+                  </a:extLst>
+                </a:gridCol>
+                <a:gridCol w="1453972">
+                  <a:extLst>
+                    <a:ext uri="{9D8B030D-6E8A-4147-A177-3AD203B41FA5}">
+                      <a16:colId xmlns:a16="http://schemas.microsoft.com/office/drawing/2014/main" val="3416176941"/>
+                    </a:ext>
+                  </a:extLst>
+                </a:gridCol>
+              </a:tblGrid>
+              <a:tr h="536904">
+                <a:tc>
+                  <a:txBody>
+                    <a:bodyPr/>
+                    <a:lstStyle/>
+                    <a:p>
+                      <a:r>
+                        <a:rPr lang="en-US" dirty="0"/>
+                        <a:t>Item #</a:t>
+                      </a:r>
+                    </a:p>
+                  </a:txBody>
+                  <a:tcPr/>
+                </a:tc>
+                <a:tc>
+                  <a:txBody>
+                    <a:bodyPr/>
+                    <a:lstStyle/>
+                    <a:p>
+                      <a:r>
+                        <a:rPr lang="en-US" dirty="0"/>
+                        <a:t>Item Name</a:t>
+                      </a:r>
+                    </a:p>
+                  </a:txBody>
+                  <a:tcPr/>
+                </a:tc>
+                <a:tc>
+                  <a:txBody>
+                    <a:bodyPr/>
+                    <a:lstStyle/>
+                    <a:p>
+                      <a:r>
+                        <a:rPr lang="en-US" dirty="0"/>
+                        <a:t>Description</a:t>
+                      </a:r>
+                    </a:p>
+                  </a:txBody>
+                  <a:tcPr/>
+                </a:tc>
+                <a:tc>
+                  <a:txBody>
+                    <a:bodyPr/>
+                    <a:lstStyle/>
+                    <a:p>
+                      <a:r>
+                        <a:rPr lang="en-US" dirty="0"/>
+                        <a:t>Factory #</a:t>
+                      </a:r>
+                    </a:p>
+                  </a:txBody>
+                  <a:tcPr/>
+                </a:tc>
+                <a:extLst>
+                  <a:ext uri="{0D108BD9-81ED-4DB2-BD59-A6C34878D82A}">
+                    <a16:rowId xmlns:a16="http://schemas.microsoft.com/office/drawing/2014/main" val="3847518865"/>
+                  </a:ext>
+                </a:extLst>
+              </a:tr>
+              <a:tr h="536904">
+                <a:tc>
+                  <a:txBody>
+                    <a:bodyPr/>
+                    <a:lstStyle/>
+                    <a:p>
+                      <a:endParaRPr lang="en-US" dirty="0"/>
+                    </a:p>
+                  </a:txBody>
+                  <a:tcPr/>
+                </a:tc>
+                <a:tc>
+                  <a:txBody>
+                    <a:bodyPr/>
+                    <a:lstStyle/>
+                    <a:p>
+                      <a:endParaRPr lang="en-US" dirty="0"/>
+                    </a:p>
+                  </a:txBody>
+                  <a:tcPr/>
+                </a:tc>
+                <a:tc>
+                  <a:txBody>
+                    <a:bodyPr/>
+                    <a:lstStyle/>
+                    <a:p>
+                      <a:endParaRPr lang="en-US" dirty="0"/>
+                    </a:p>
+                  </a:txBody>
+                  <a:tcPr/>
+                </a:tc>
+                <a:tc>
+                  <a:txBody>
+                    <a:bodyPr/>
+                    <a:lstStyle/>
+                    <a:p>
+                      <a:endParaRPr lang="en-US" dirty="0"/>
+                    </a:p>
+                  </a:txBody>
+                  <a:tcPr/>
+                </a:tc>
+                <a:extLst>
+                  <a:ext uri="{0D108BD9-81ED-4DB2-BD59-A6C34878D82A}">
+                    <a16:rowId xmlns:a16="http://schemas.microsoft.com/office/drawing/2014/main" val="159226802"/>
+                  </a:ext>
+                </a:extLst>
+              </a:tr>
+            </a:tbl>
+          </a:graphicData>
+        </a:graphic>
+      </p:graphicFrame>
+      <p:graphicFrame>
+        <p:nvGraphicFramePr>
+          <p:cNvPr id="8" name="Table 4">
+            <a:extLst>
+              <a:ext uri="{FF2B5EF4-FFF2-40B4-BE49-F238E27FC236}">
+                <a16:creationId xmlns:a16="http://schemas.microsoft.com/office/drawing/2014/main" id="{BB07AEFD-72D8-4FD8-A494-7AB816641DFD}"/>
+              </a:ext>
+            </a:extLst>
+          </p:cNvPr>
+          <p:cNvGraphicFramePr>
+            <a:graphicFrameLocks noGrp="1"/>
+          </p:cNvGraphicFramePr>
+          <p:nvPr/>
+        </p:nvGraphicFramePr>
+        <p:xfrm>
+          <a:off x="6227985" y="2738908"/>
+          <a:ext cx="5815887" cy="1073808"/>
+        </p:xfrm>
+        <a:graphic>
+          <a:graphicData uri="http://schemas.openxmlformats.org/drawingml/2006/table">
+            <a:tbl>
+              <a:tblPr firstRow="1" bandRow="1">
+                <a:tableStyleId>{5C22544A-7EE6-4342-B048-85BDC9FD1C3A}</a:tableStyleId>
+              </a:tblPr>
+              <a:tblGrid>
+                <a:gridCol w="1938629">
+                  <a:extLst>
+                    <a:ext uri="{9D8B030D-6E8A-4147-A177-3AD203B41FA5}">
+                      <a16:colId xmlns:a16="http://schemas.microsoft.com/office/drawing/2014/main" val="93918904"/>
+                    </a:ext>
+                  </a:extLst>
+                </a:gridCol>
+                <a:gridCol w="1938629">
+                  <a:extLst>
+                    <a:ext uri="{9D8B030D-6E8A-4147-A177-3AD203B41FA5}">
+                      <a16:colId xmlns:a16="http://schemas.microsoft.com/office/drawing/2014/main" val="1897031396"/>
+                    </a:ext>
+                  </a:extLst>
+                </a:gridCol>
+                <a:gridCol w="1938629">
+                  <a:extLst>
+                    <a:ext uri="{9D8B030D-6E8A-4147-A177-3AD203B41FA5}">
+                      <a16:colId xmlns:a16="http://schemas.microsoft.com/office/drawing/2014/main" val="3416176941"/>
+                    </a:ext>
+                  </a:extLst>
+                </a:gridCol>
+              </a:tblGrid>
+              <a:tr h="536904">
+                <a:tc>
+                  <a:txBody>
+                    <a:bodyPr/>
+                    <a:lstStyle/>
+                    <a:p>
+                      <a:r>
+                        <a:rPr lang="en-US" dirty="0"/>
+                        <a:t>Factory #</a:t>
+                      </a:r>
+                    </a:p>
+                  </a:txBody>
+                  <a:tcPr/>
+                </a:tc>
+                <a:tc>
+                  <a:txBody>
+                    <a:bodyPr/>
+                    <a:lstStyle/>
+                    <a:p>
+                      <a:r>
+                        <a:rPr lang="en-US" dirty="0"/>
+                        <a:t>Stock</a:t>
+                      </a:r>
+                    </a:p>
+                  </a:txBody>
+                  <a:tcPr/>
+                </a:tc>
+                <a:tc>
+                  <a:txBody>
+                    <a:bodyPr/>
+                    <a:lstStyle/>
+                    <a:p>
+                      <a:r>
+                        <a:rPr lang="en-US" dirty="0"/>
+                        <a:t>Contact Info</a:t>
+                      </a:r>
+                    </a:p>
+                  </a:txBody>
+                  <a:tcPr/>
+                </a:tc>
+                <a:extLst>
+                  <a:ext uri="{0D108BD9-81ED-4DB2-BD59-A6C34878D82A}">
+                    <a16:rowId xmlns:a16="http://schemas.microsoft.com/office/drawing/2014/main" val="3847518865"/>
+                  </a:ext>
+                </a:extLst>
+              </a:tr>
+              <a:tr h="536904">
+                <a:tc>
+                  <a:txBody>
+                    <a:bodyPr/>
+                    <a:lstStyle/>
+                    <a:p>
+                      <a:endParaRPr lang="en-US" dirty="0"/>
+                    </a:p>
+                  </a:txBody>
+                  <a:tcPr/>
+                </a:tc>
+                <a:tc>
+                  <a:txBody>
+                    <a:bodyPr/>
+                    <a:lstStyle/>
+                    <a:p>
+                      <a:endParaRPr lang="en-US" dirty="0"/>
+                    </a:p>
+                  </a:txBody>
+                  <a:tcPr/>
+                </a:tc>
+                <a:tc>
+                  <a:txBody>
+                    <a:bodyPr/>
+                    <a:lstStyle/>
+                    <a:p>
+                      <a:endParaRPr lang="en-US" dirty="0"/>
+                    </a:p>
+                  </a:txBody>
+                  <a:tcPr/>
+                </a:tc>
+                <a:extLst>
+                  <a:ext uri="{0D108BD9-81ED-4DB2-BD59-A6C34878D82A}">
+                    <a16:rowId xmlns:a16="http://schemas.microsoft.com/office/drawing/2014/main" val="159226802"/>
+                  </a:ext>
+                </a:extLst>
+              </a:tr>
+            </a:tbl>
+          </a:graphicData>
+        </a:graphic>
+      </p:graphicFrame>
+    </p:spTree>
+    <p:extLst>
+      <p:ext uri="{BB962C8B-B14F-4D97-AF65-F5344CB8AC3E}">
+        <p14:creationId xmlns:p14="http://schemas.microsoft.com/office/powerpoint/2010/main" val="1020574341"/>
+      </p:ext>
+    </p:extLst>
+  </p:cSld>
+  <p:clrMapOvr>
+    <a:masterClrMapping/>
+  </p:clrMapOvr>
+</p:sld>
+</file>
+
 <file path=ppt/theme/theme1.xml><?xml version="1.0" encoding="utf-8"?>
 <a:theme xmlns:a="http://schemas.openxmlformats.org/drawingml/2006/main" name="Office Theme">
   <a:themeElements>

</xml_diff>